<commit_message>
ajout date ppt 1 et 2
</commit_message>
<xml_diff>
--- a/1-Introduction_au_Datamining.pptx
+++ b/1-Introduction_au_Datamining.pptx
@@ -216,7 +216,7 @@
           <a:p>
             <a:fld id="{FFC98EE4-CF93-4259-A384-F434AF016922}" type="datetimeFigureOut">
               <a:rPr lang="fr-FR" smtClean="0"/>
-              <a:t>20/04/2024</a:t>
+              <a:t>21/04/2024</a:t>
             </a:fld>
             <a:endParaRPr lang="fr-FR"/>
           </a:p>
@@ -406,7 +406,7 @@
           <a:effectLst/>
           <a:extLst>
             <a:ext uri="{91240B29-F687-4f45-9708-019B960494DF}">
-              <a14:hiddenLine xmlns:a14="http://schemas.microsoft.com/office/drawing/2010/main" xmlns="" w="9525">
+              <a14:hiddenLine xmlns="" xmlns:a14="http://schemas.microsoft.com/office/drawing/2010/main" w="9525">
                 <a:solidFill>
                   <a:srgbClr val="000000"/>
                 </a:solidFill>
@@ -599,7 +599,7 @@
             <a:fld id="{08B9EBBA-996F-894A-B54A-D6246ED52CEA}" type="datetimeFigureOut">
               <a:rPr lang="en-US" dirty="0"/>
               <a:pPr/>
-              <a:t>4/20/2024</a:t>
+              <a:t>4/21/2024</a:t>
             </a:fld>
             <a:endParaRPr lang="en-US" dirty="0"/>
           </a:p>
@@ -944,7 +944,7 @@
             <a:fld id="{18C79C5D-2A6F-F04D-97DA-BEF2467B64E4}" type="datetimeFigureOut">
               <a:rPr lang="en-US" dirty="0"/>
               <a:pPr/>
-              <a:t>4/20/2024</a:t>
+              <a:t>4/21/2024</a:t>
             </a:fld>
             <a:endParaRPr lang="en-US" dirty="0"/>
           </a:p>
@@ -1429,7 +1429,7 @@
             <a:fld id="{8DFA1846-DA80-1C48-A609-854EA85C59AD}" type="datetimeFigureOut">
               <a:rPr lang="en-US" dirty="0"/>
               <a:pPr/>
-              <a:t>4/20/2024</a:t>
+              <a:t>4/21/2024</a:t>
             </a:fld>
             <a:endParaRPr lang="en-US" dirty="0"/>
           </a:p>
@@ -1795,7 +1795,7 @@
             <a:fld id="{FBF54567-0DE4-3F47-BF90-CB84690072F9}" type="datetimeFigureOut">
               <a:rPr lang="en-US" dirty="0"/>
               <a:pPr/>
-              <a:t>4/20/2024</a:t>
+              <a:t>4/21/2024</a:t>
             </a:fld>
             <a:endParaRPr lang="en-US" dirty="0"/>
           </a:p>
@@ -1946,7 +1946,7 @@
           <a:ln/>
           <a:extLst>
             <a:ext uri="{91240B29-F687-4f45-9708-019B960494DF}">
-              <a14:hiddenLine xmlns:a14="http://schemas.microsoft.com/office/drawing/2010/main" xmlns="" w="9525">
+              <a14:hiddenLine xmlns="" xmlns:a14="http://schemas.microsoft.com/office/drawing/2010/main" w="9525">
                 <a:solidFill>
                   <a:srgbClr val="000000"/>
                 </a:solidFill>
@@ -2065,7 +2065,7 @@
             <a:fld id="{C6C52C72-DE31-F449-A4ED-4C594FD91407}" type="datetimeFigureOut">
               <a:rPr lang="en-US" dirty="0"/>
               <a:pPr/>
-              <a:t>4/20/2024</a:t>
+              <a:t>4/21/2024</a:t>
             </a:fld>
             <a:endParaRPr lang="en-US" dirty="0"/>
           </a:p>
@@ -2218,7 +2218,7 @@
           <a:ln/>
           <a:extLst>
             <a:ext uri="{91240B29-F687-4f45-9708-019B960494DF}">
-              <a14:hiddenLine xmlns:a14="http://schemas.microsoft.com/office/drawing/2010/main" xmlns="" w="9525">
+              <a14:hiddenLine xmlns="" xmlns:a14="http://schemas.microsoft.com/office/drawing/2010/main" w="9525">
                 <a:solidFill>
                   <a:srgbClr val="000000"/>
                 </a:solidFill>
@@ -2347,7 +2347,7 @@
             <a:fld id="{ED62726E-379B-B349-9EED-81ED093FA806}" type="datetimeFigureOut">
               <a:rPr lang="en-US" dirty="0"/>
               <a:pPr/>
-              <a:t>4/20/2024</a:t>
+              <a:t>4/21/2024</a:t>
             </a:fld>
             <a:endParaRPr lang="en-US" dirty="0"/>
           </a:p>
@@ -2498,7 +2498,7 @@
           <a:ln/>
           <a:extLst>
             <a:ext uri="{91240B29-F687-4f45-9708-019B960494DF}">
-              <a14:hiddenLine xmlns:a14="http://schemas.microsoft.com/office/drawing/2010/main" xmlns="" w="9525">
+              <a14:hiddenLine xmlns="" xmlns:a14="http://schemas.microsoft.com/office/drawing/2010/main" w="9525">
                 <a:solidFill>
                   <a:srgbClr val="000000"/>
                 </a:solidFill>
@@ -2627,7 +2627,7 @@
             <a:fld id="{9B3A1323-8D79-1946-B0D7-40001CF92E9D}" type="datetimeFigureOut">
               <a:rPr lang="en-US" dirty="0"/>
               <a:pPr/>
-              <a:t>4/20/2024</a:t>
+              <a:t>4/21/2024</a:t>
             </a:fld>
             <a:endParaRPr lang="en-US" dirty="0"/>
           </a:p>
@@ -2997,7 +2997,7 @@
             <a:fld id="{8DFA1846-DA80-1C48-A609-854EA85C59AD}" type="datetimeFigureOut">
               <a:rPr lang="en-US" dirty="0"/>
               <a:pPr/>
-              <a:t>4/20/2024</a:t>
+              <a:t>4/21/2024</a:t>
             </a:fld>
             <a:endParaRPr lang="en-US" dirty="0"/>
           </a:p>
@@ -3148,7 +3148,7 @@
           <a:ln/>
           <a:extLst>
             <a:ext uri="{91240B29-F687-4f45-9708-019B960494DF}">
-              <a14:hiddenLine xmlns:a14="http://schemas.microsoft.com/office/drawing/2010/main" xmlns="" w="9525">
+              <a14:hiddenLine xmlns="" xmlns:a14="http://schemas.microsoft.com/office/drawing/2010/main" w="9525">
                 <a:solidFill>
                   <a:srgbClr val="000000"/>
                 </a:solidFill>
@@ -3333,7 +3333,7 @@
             <a:fld id="{57302355-E14B-8545-A8F8-0FE83CC9D524}" type="datetimeFigureOut">
               <a:rPr lang="en-US" dirty="0"/>
               <a:pPr/>
-              <a:t>4/20/2024</a:t>
+              <a:t>4/21/2024</a:t>
             </a:fld>
             <a:endParaRPr lang="en-US" dirty="0"/>
           </a:p>
@@ -3484,7 +3484,7 @@
           <a:ln/>
           <a:extLst>
             <a:ext uri="{91240B29-F687-4f45-9708-019B960494DF}">
-              <a14:hiddenLine xmlns:a14="http://schemas.microsoft.com/office/drawing/2010/main" xmlns="" w="9525">
+              <a14:hiddenLine xmlns="" xmlns:a14="http://schemas.microsoft.com/office/drawing/2010/main" w="9525">
                 <a:solidFill>
                   <a:srgbClr val="000000"/>
                 </a:solidFill>
@@ -3807,7 +3807,7 @@
             <a:fld id="{02640F58-564D-2B4F-AE67-E407BA4FCF45}" type="datetimeFigureOut">
               <a:rPr lang="en-US" dirty="0"/>
               <a:pPr/>
-              <a:t>4/20/2024</a:t>
+              <a:t>4/21/2024</a:t>
             </a:fld>
             <a:endParaRPr lang="en-US" dirty="0"/>
           </a:p>
@@ -3958,7 +3958,7 @@
           <a:ln/>
           <a:extLst>
             <a:ext uri="{91240B29-F687-4f45-9708-019B960494DF}">
-              <a14:hiddenLine xmlns:a14="http://schemas.microsoft.com/office/drawing/2010/main" xmlns="" w="9525">
+              <a14:hiddenLine xmlns="" xmlns:a14="http://schemas.microsoft.com/office/drawing/2010/main" w="9525">
                 <a:solidFill>
                   <a:srgbClr val="000000"/>
                 </a:solidFill>
@@ -4025,7 +4025,7 @@
             <a:fld id="{F13A34C8-038E-2045-AF43-DF7DBB8E0E9E}" type="datetimeFigureOut">
               <a:rPr lang="en-US" dirty="0"/>
               <a:pPr/>
-              <a:t>4/20/2024</a:t>
+              <a:t>4/21/2024</a:t>
             </a:fld>
             <a:endParaRPr lang="en-US" dirty="0"/>
           </a:p>
@@ -4117,7 +4117,7 @@
             <a:fld id="{8818C68F-D26B-8F47-958C-23B49CF8A634}" type="datetimeFigureOut">
               <a:rPr lang="en-US" dirty="0"/>
               <a:pPr/>
-              <a:t>4/20/2024</a:t>
+              <a:t>4/21/2024</a:t>
             </a:fld>
             <a:endParaRPr lang="en-US" dirty="0"/>
           </a:p>
@@ -4381,7 +4381,7 @@
           <a:ln/>
           <a:extLst>
             <a:ext uri="{91240B29-F687-4f45-9708-019B960494DF}">
-              <a14:hiddenLine xmlns:a14="http://schemas.microsoft.com/office/drawing/2010/main" xmlns="" w="9525">
+              <a14:hiddenLine xmlns="" xmlns:a14="http://schemas.microsoft.com/office/drawing/2010/main" w="9525">
                 <a:solidFill>
                   <a:srgbClr val="000000"/>
                 </a:solidFill>
@@ -4581,7 +4581,7 @@
             <a:fld id="{D0DF5E60-9974-AC48-9591-99C2BB44B7CF}" type="datetimeFigureOut">
               <a:rPr lang="en-US" dirty="0"/>
               <a:pPr/>
-              <a:t>4/20/2024</a:t>
+              <a:t>4/21/2024</a:t>
             </a:fld>
             <a:endParaRPr lang="en-US" dirty="0"/>
           </a:p>
@@ -4891,7 +4891,7 @@
             <a:fld id="{18C79C5D-2A6F-F04D-97DA-BEF2467B64E4}" type="datetimeFigureOut">
               <a:rPr lang="en-US" dirty="0"/>
               <a:pPr/>
-              <a:t>4/20/2024</a:t>
+              <a:t>4/21/2024</a:t>
             </a:fld>
             <a:endParaRPr lang="en-US" dirty="0"/>
           </a:p>
@@ -5158,7 +5158,7 @@
             <a:fld id="{09B482E8-6E0E-1B4F-B1FD-C69DB9E858D9}" type="datetimeFigureOut">
               <a:rPr lang="en-US" dirty="0"/>
               <a:pPr/>
-              <a:t>4/20/2024</a:t>
+              <a:t>4/21/2024</a:t>
             </a:fld>
             <a:endParaRPr lang="en-US" dirty="0"/>
           </a:p>
@@ -5661,7 +5661,10 @@
               <a:rPr lang="fr-FR" dirty="0" err="1"/>
               <a:t>Diteschool</a:t>
             </a:r>
-            <a:endParaRPr lang="fr-FR" dirty="0"/>
+            <a:r>
+              <a:rPr lang="fr-FR" dirty="0"/>
+              <a:t> – 22/04/2024</a:t>
+            </a:r>
           </a:p>
         </p:txBody>
       </p:sp>

</xml_diff>